<commit_message>
Update 07.1 AsyncTask and AsyncTaskLoader.pptx
</commit_message>
<xml_diff>
--- a/Presentation/Android Developer Fundamentals/Unit3/07.1 AsyncTask and AsyncTaskLoader.pptx
+++ b/Presentation/Android Developer Fundamentals/Unit3/07.1 AsyncTask and AsyncTaskLoader.pptx
@@ -326,6 +326,11 @@
       </a:defRPr>
     </a:lvl9pPr>
   </p:defaultTextStyle>
+  <p:extLst>
+    <p:ext uri="{EFAFB233-063F-42B5-8137-9DF3F51BA10A}">
+      <p15:sldGuideLst xmlns:p15="http://schemas.microsoft.com/office/powerpoint/2012/main"/>
+    </p:ext>
+  </p:extLst>
 </p:presentation>
 </file>
 
@@ -1527,7 +1532,7 @@
         </p:nvSpPr>
         <p:spPr>
           <a:xfrm>
-            <a:off x="381300" y="685800"/>
+            <a:off x="381000" y="685800"/>
             <a:ext cx="6096000" cy="3429000"/>
           </a:xfrm>
           <a:custGeom>
@@ -1631,7 +1636,7 @@
         </p:nvSpPr>
         <p:spPr>
           <a:xfrm>
-            <a:off x="381300" y="685800"/>
+            <a:off x="381000" y="685800"/>
             <a:ext cx="6096000" cy="3429000"/>
           </a:xfrm>
           <a:custGeom>
@@ -3399,7 +3404,7 @@
         </p:nvSpPr>
         <p:spPr>
           <a:xfrm>
-            <a:off x="381300" y="685800"/>
+            <a:off x="381000" y="685800"/>
             <a:ext cx="6096000" cy="3429000"/>
           </a:xfrm>
           <a:custGeom>
@@ -46016,10 +46021,14 @@
               <a:buNone/>
             </a:pPr>
             <a:r>
-              <a:rPr lang="en"/>
-              <a:t>AsyncTask helper methods</a:t>
+              <a:rPr lang="en" dirty="0" err="1"/>
+              <a:t>AsyncTask</a:t>
             </a:r>
-            <a:endParaRPr/>
+            <a:r>
+              <a:rPr lang="en" dirty="0"/>
+              <a:t> helper methods</a:t>
+            </a:r>
+            <a:endParaRPr dirty="0"/>
           </a:p>
         </p:txBody>
       </p:sp>
@@ -46965,10 +46974,14 @@
               <a:buAutoNum type="arabicPeriod"/>
             </a:pPr>
             <a:r>
-              <a:rPr lang="en"/>
-              <a:t>Subclass AsyncTask</a:t>
+              <a:rPr lang="en" dirty="0"/>
+              <a:t>Subclass </a:t>
             </a:r>
-            <a:endParaRPr/>
+            <a:r>
+              <a:rPr lang="en" dirty="0" err="1"/>
+              <a:t>AsyncTask</a:t>
+            </a:r>
+            <a:endParaRPr dirty="0"/>
           </a:p>
           <a:p>
             <a:pPr marL="457200" lvl="0" indent="-381000" algn="l" rtl="0">
@@ -46982,19 +46995,28 @@
               <a:buAutoNum type="arabicPeriod"/>
             </a:pPr>
             <a:r>
-              <a:rPr lang="en"/>
+              <a:rPr lang="en" dirty="0"/>
               <a:t>Provide data type sent to </a:t>
             </a:r>
             <a:r>
-              <a:rPr lang="en">
+              <a:rPr lang="en" dirty="0" err="1">
                 <a:latin typeface="Consolas"/>
                 <a:ea typeface="Consolas"/>
                 <a:cs typeface="Consolas"/>
                 <a:sym typeface="Consolas"/>
               </a:rPr>
-              <a:t>doInBackground()</a:t>
+              <a:t>doInBackground</a:t>
             </a:r>
-            <a:endParaRPr>
+            <a:r>
+              <a:rPr lang="en" dirty="0">
+                <a:latin typeface="Consolas"/>
+                <a:ea typeface="Consolas"/>
+                <a:cs typeface="Consolas"/>
+                <a:sym typeface="Consolas"/>
+              </a:rPr>
+              <a:t>()</a:t>
+            </a:r>
+            <a:endParaRPr dirty="0">
               <a:latin typeface="Consolas"/>
               <a:ea typeface="Consolas"/>
               <a:cs typeface="Consolas"/>
@@ -47013,19 +47035,28 @@
               <a:buAutoNum type="arabicPeriod"/>
             </a:pPr>
             <a:r>
-              <a:rPr lang="en"/>
+              <a:rPr lang="en" dirty="0"/>
               <a:t>Provide data type of progress units for </a:t>
             </a:r>
             <a:r>
-              <a:rPr lang="en">
+              <a:rPr lang="en" dirty="0" err="1">
                 <a:latin typeface="Consolas"/>
                 <a:ea typeface="Consolas"/>
                 <a:cs typeface="Consolas"/>
                 <a:sym typeface="Consolas"/>
               </a:rPr>
-              <a:t>onProgressUpdate()</a:t>
+              <a:t>onProgressUpdate</a:t>
             </a:r>
-            <a:endParaRPr>
+            <a:r>
+              <a:rPr lang="en" dirty="0">
+                <a:latin typeface="Consolas"/>
+                <a:ea typeface="Consolas"/>
+                <a:cs typeface="Consolas"/>
+                <a:sym typeface="Consolas"/>
+              </a:rPr>
+              <a:t>()</a:t>
+            </a:r>
+            <a:endParaRPr dirty="0">
               <a:latin typeface="Consolas"/>
               <a:ea typeface="Consolas"/>
               <a:cs typeface="Consolas"/>
@@ -47044,19 +47075,28 @@
               <a:buAutoNum type="arabicPeriod"/>
             </a:pPr>
             <a:r>
-              <a:rPr lang="en"/>
+              <a:rPr lang="en" dirty="0"/>
               <a:t>Provide data type of result for </a:t>
             </a:r>
             <a:r>
-              <a:rPr lang="en">
+              <a:rPr lang="en" dirty="0" err="1">
                 <a:latin typeface="Consolas"/>
                 <a:ea typeface="Consolas"/>
                 <a:cs typeface="Consolas"/>
                 <a:sym typeface="Consolas"/>
               </a:rPr>
-              <a:t>onPostExecute()</a:t>
+              <a:t>onPostExecute</a:t>
             </a:r>
-            <a:endParaRPr sz="1800">
+            <a:r>
+              <a:rPr lang="en" dirty="0">
+                <a:latin typeface="Consolas"/>
+                <a:ea typeface="Consolas"/>
+                <a:cs typeface="Consolas"/>
+                <a:sym typeface="Consolas"/>
+              </a:rPr>
+              <a:t>()</a:t>
+            </a:r>
+            <a:endParaRPr sz="1800" dirty="0">
               <a:latin typeface="Consolas"/>
               <a:ea typeface="Consolas"/>
               <a:cs typeface="Consolas"/>
@@ -47073,7 +47113,43 @@
               </a:spcAft>
               <a:buNone/>
             </a:pPr>
-            <a:endParaRPr sz="1800">
+            <a:r>
+              <a:rPr lang="zh-CN" altLang="en-US" dirty="0">
+                <a:latin typeface="Consolas"/>
+                <a:ea typeface="Consolas"/>
+                <a:cs typeface="Consolas"/>
+                <a:sym typeface="Consolas"/>
+              </a:rPr>
+              <a:t>   </a:t>
+            </a:r>
+            <a:r>
+              <a:rPr lang="en" dirty="0">
+                <a:latin typeface="Consolas"/>
+                <a:ea typeface="Consolas"/>
+                <a:cs typeface="Consolas"/>
+                <a:sym typeface="Consolas"/>
+              </a:rPr>
+              <a:t>private class </a:t>
+            </a:r>
+            <a:r>
+              <a:rPr lang="en" dirty="0" err="1">
+                <a:latin typeface="Consolas"/>
+                <a:ea typeface="Consolas"/>
+                <a:cs typeface="Consolas"/>
+                <a:sym typeface="Consolas"/>
+              </a:rPr>
+              <a:t>MyAsyncTask</a:t>
+            </a:r>
+            <a:r>
+              <a:rPr lang="en" dirty="0">
+                <a:latin typeface="Consolas"/>
+                <a:ea typeface="Consolas"/>
+                <a:cs typeface="Consolas"/>
+                <a:sym typeface="Consolas"/>
+              </a:rPr>
+              <a:t> </a:t>
+            </a:r>
+            <a:endParaRPr dirty="0">
               <a:latin typeface="Consolas"/>
               <a:ea typeface="Consolas"/>
               <a:cs typeface="Consolas"/>
@@ -47088,32 +47164,6 @@
               <a:spcAft>
                 <a:spcPts val="0"/>
               </a:spcAft>
-              <a:buNone/>
-            </a:pPr>
-            <a:r>
-              <a:rPr lang="en">
-                <a:latin typeface="Consolas"/>
-                <a:ea typeface="Consolas"/>
-                <a:cs typeface="Consolas"/>
-                <a:sym typeface="Consolas"/>
-              </a:rPr>
-              <a:t>private class MyAsyncTask </a:t>
-            </a:r>
-            <a:endParaRPr>
-              <a:latin typeface="Consolas"/>
-              <a:ea typeface="Consolas"/>
-              <a:cs typeface="Consolas"/>
-              <a:sym typeface="Consolas"/>
-            </a:endParaRPr>
-          </a:p>
-          <a:p>
-            <a:pPr marL="0" lvl="0" indent="0" algn="l" rtl="0">
-              <a:spcBef>
-                <a:spcPts val="0"/>
-              </a:spcBef>
-              <a:spcAft>
-                <a:spcPts val="0"/>
-              </a:spcAft>
               <a:buClr>
                 <a:schemeClr val="dk1"/>
               </a:buClr>
@@ -47122,7 +47172,7 @@
               <a:buNone/>
             </a:pPr>
             <a:r>
-              <a:rPr lang="en">
+              <a:rPr lang="en" dirty="0">
                 <a:latin typeface="Consolas"/>
                 <a:ea typeface="Consolas"/>
                 <a:cs typeface="Consolas"/>
@@ -47131,16 +47181,25 @@
               <a:t>    </a:t>
             </a:r>
             <a:r>
-              <a:rPr lang="en" b="1">
+              <a:rPr lang="en" b="1" dirty="0">
                 <a:latin typeface="Consolas"/>
                 <a:ea typeface="Consolas"/>
                 <a:cs typeface="Consolas"/>
                 <a:sym typeface="Consolas"/>
               </a:rPr>
-              <a:t>extends AsyncTask</a:t>
+              <a:t>extends </a:t>
             </a:r>
             <a:r>
-              <a:rPr lang="en">
+              <a:rPr lang="en" b="1" dirty="0" err="1">
+                <a:latin typeface="Consolas"/>
+                <a:ea typeface="Consolas"/>
+                <a:cs typeface="Consolas"/>
+                <a:sym typeface="Consolas"/>
+              </a:rPr>
+              <a:t>AsyncTask</a:t>
+            </a:r>
+            <a:r>
+              <a:rPr lang="en" dirty="0">
                 <a:latin typeface="Consolas"/>
                 <a:ea typeface="Consolas"/>
                 <a:cs typeface="Consolas"/>
@@ -47149,7 +47208,7 @@
               <a:t>&lt;</a:t>
             </a:r>
             <a:r>
-              <a:rPr lang="en" b="1">
+              <a:rPr lang="en" b="1" dirty="0">
                 <a:latin typeface="Consolas"/>
                 <a:ea typeface="Consolas"/>
                 <a:cs typeface="Consolas"/>
@@ -47158,7 +47217,7 @@
               <a:t>URL</a:t>
             </a:r>
             <a:r>
-              <a:rPr lang="en">
+              <a:rPr lang="en" dirty="0">
                 <a:latin typeface="Consolas"/>
                 <a:ea typeface="Consolas"/>
                 <a:cs typeface="Consolas"/>
@@ -47167,7 +47226,7 @@
               <a:t>, </a:t>
             </a:r>
             <a:r>
-              <a:rPr lang="en" b="1">
+              <a:rPr lang="en" b="1" dirty="0">
                 <a:latin typeface="Consolas"/>
                 <a:ea typeface="Consolas"/>
                 <a:cs typeface="Consolas"/>
@@ -47176,7 +47235,7 @@
               <a:t>Integer</a:t>
             </a:r>
             <a:r>
-              <a:rPr lang="en">
+              <a:rPr lang="en" dirty="0">
                 <a:latin typeface="Consolas"/>
                 <a:ea typeface="Consolas"/>
                 <a:cs typeface="Consolas"/>
@@ -47185,7 +47244,7 @@
               <a:t>, </a:t>
             </a:r>
             <a:r>
-              <a:rPr lang="en" b="1">
+              <a:rPr lang="en" b="1" dirty="0">
                 <a:latin typeface="Consolas"/>
                 <a:ea typeface="Consolas"/>
                 <a:cs typeface="Consolas"/>
@@ -47194,7 +47253,7 @@
               <a:t>Bitmap</a:t>
             </a:r>
             <a:r>
-              <a:rPr lang="en">
+              <a:rPr lang="en" dirty="0">
                 <a:latin typeface="Consolas"/>
                 <a:ea typeface="Consolas"/>
                 <a:cs typeface="Consolas"/>
@@ -47202,7 +47261,7 @@
               </a:rPr>
               <a:t>&gt; {...}</a:t>
             </a:r>
-            <a:endParaRPr/>
+            <a:endParaRPr dirty="0"/>
           </a:p>
         </p:txBody>
       </p:sp>
@@ -47350,15 +47409,33 @@
               <a:buNone/>
             </a:pPr>
             <a:r>
-              <a:rPr lang="en">
+              <a:rPr lang="en" dirty="0">
                 <a:latin typeface="Consolas"/>
                 <a:ea typeface="Consolas"/>
                 <a:cs typeface="Consolas"/>
                 <a:sym typeface="Consolas"/>
               </a:rPr>
-              <a:t>private class MyAsyncTask </a:t>
+              <a:t>private class </a:t>
             </a:r>
-            <a:endParaRPr>
+            <a:r>
+              <a:rPr lang="en" dirty="0" err="1">
+                <a:latin typeface="Consolas"/>
+                <a:ea typeface="Consolas"/>
+                <a:cs typeface="Consolas"/>
+                <a:sym typeface="Consolas"/>
+              </a:rPr>
+              <a:t>MyAsyncTask</a:t>
+            </a:r>
+            <a:r>
+              <a:rPr lang="en" dirty="0">
+                <a:latin typeface="Consolas"/>
+                <a:ea typeface="Consolas"/>
+                <a:cs typeface="Consolas"/>
+                <a:sym typeface="Consolas"/>
+              </a:rPr>
+              <a:t> </a:t>
+            </a:r>
+            <a:endParaRPr dirty="0">
               <a:latin typeface="Consolas"/>
               <a:ea typeface="Consolas"/>
               <a:cs typeface="Consolas"/>
@@ -47376,15 +47453,33 @@
               <a:buNone/>
             </a:pPr>
             <a:r>
-              <a:rPr lang="en">
+              <a:rPr lang="en" dirty="0">
                 <a:latin typeface="Consolas"/>
                 <a:ea typeface="Consolas"/>
                 <a:cs typeface="Consolas"/>
                 <a:sym typeface="Consolas"/>
               </a:rPr>
-              <a:t>    extends AsyncTask&lt;String, Integer, Bitmap&gt; {...}</a:t>
+              <a:t>    extends </a:t>
             </a:r>
-            <a:endParaRPr>
+            <a:r>
+              <a:rPr lang="en" dirty="0" err="1">
+                <a:latin typeface="Consolas"/>
+                <a:ea typeface="Consolas"/>
+                <a:cs typeface="Consolas"/>
+                <a:sym typeface="Consolas"/>
+              </a:rPr>
+              <a:t>AsyncTask</a:t>
+            </a:r>
+            <a:r>
+              <a:rPr lang="en" dirty="0">
+                <a:latin typeface="Consolas"/>
+                <a:ea typeface="Consolas"/>
+                <a:cs typeface="Consolas"/>
+                <a:sym typeface="Consolas"/>
+              </a:rPr>
+              <a:t>&lt;String, Integer, Bitmap&gt; {...}</a:t>
+            </a:r>
+            <a:endParaRPr dirty="0">
               <a:latin typeface="Consolas"/>
               <a:ea typeface="Consolas"/>
               <a:cs typeface="Consolas"/>
@@ -47401,7 +47496,7 @@
               </a:spcAft>
               <a:buNone/>
             </a:pPr>
-            <a:endParaRPr>
+            <a:endParaRPr dirty="0">
               <a:latin typeface="Consolas"/>
               <a:ea typeface="Consolas"/>
               <a:cs typeface="Consolas"/>
@@ -47427,7 +47522,7 @@
               <a:buNone/>
             </a:pPr>
             <a:r>
-              <a:rPr lang="en" sz="1800">
+              <a:rPr lang="en" sz="1800" dirty="0" err="1">
                 <a:solidFill>
                   <a:srgbClr val="FFFFFF"/>
                 </a:solidFill>
@@ -47436,9 +47531,21 @@
                 <a:cs typeface="Consolas"/>
                 <a:sym typeface="Consolas"/>
               </a:rPr>
-              <a:t>doInBackground()</a:t>
+              <a:t>doInBackground</a:t>
             </a:r>
-            <a:endParaRPr sz="1800">
+            <a:r>
+              <a:rPr lang="en" sz="1800" dirty="0">
+                <a:solidFill>
+                  <a:srgbClr val="FFFFFF"/>
+                </a:solidFill>
+                <a:latin typeface="Consolas"/>
+                <a:ea typeface="Consolas"/>
+                <a:cs typeface="Consolas"/>
+                <a:sym typeface="Consolas"/>
+              </a:rPr>
+              <a:t>()</a:t>
+            </a:r>
+            <a:endParaRPr sz="1800" dirty="0">
               <a:solidFill>
                 <a:srgbClr val="FFFFFF"/>
               </a:solidFill>
@@ -47462,7 +47569,7 @@
               <a:buNone/>
             </a:pPr>
             <a:r>
-              <a:rPr lang="en" sz="1800">
+              <a:rPr lang="en" sz="1800" dirty="0" err="1">
                 <a:solidFill>
                   <a:srgbClr val="FFFFFF"/>
                 </a:solidFill>
@@ -47471,9 +47578,21 @@
                 <a:cs typeface="Consolas"/>
                 <a:sym typeface="Consolas"/>
               </a:rPr>
-              <a:t>doInBackground(</a:t>
+              <a:t>doInBackground</a:t>
             </a:r>
-            <a:endParaRPr>
+            <a:r>
+              <a:rPr lang="en" sz="1800" dirty="0">
+                <a:solidFill>
+                  <a:srgbClr val="FFFFFF"/>
+                </a:solidFill>
+                <a:latin typeface="Consolas"/>
+                <a:ea typeface="Consolas"/>
+                <a:cs typeface="Consolas"/>
+                <a:sym typeface="Consolas"/>
+              </a:rPr>
+              <a:t>(</a:t>
+            </a:r>
+            <a:endParaRPr dirty="0">
               <a:latin typeface="Consolas"/>
               <a:ea typeface="Consolas"/>
               <a:cs typeface="Consolas"/>
@@ -47492,10 +47611,10 @@
               <a:buChar char="●"/>
             </a:pPr>
             <a:r>
-              <a:rPr lang="en"/>
+              <a:rPr lang="en" dirty="0"/>
               <a:t>String—could be query, URI for filename</a:t>
             </a:r>
-            <a:endParaRPr/>
+            <a:endParaRPr dirty="0"/>
           </a:p>
           <a:p>
             <a:pPr marL="457200" lvl="0" indent="-381000" algn="l" rtl="0">
@@ -47509,10 +47628,10 @@
               <a:buChar char="●"/>
             </a:pPr>
             <a:r>
-              <a:rPr lang="en"/>
+              <a:rPr lang="en" dirty="0"/>
               <a:t>Integer—percentage completed, steps done</a:t>
             </a:r>
-            <a:endParaRPr/>
+            <a:endParaRPr dirty="0"/>
           </a:p>
           <a:p>
             <a:pPr marL="457200" lvl="0" indent="-381000" algn="l" rtl="0">
@@ -47526,27 +47645,10 @@
               <a:buChar char="●"/>
             </a:pPr>
             <a:r>
-              <a:rPr lang="en"/>
+              <a:rPr lang="en" dirty="0"/>
               <a:t>Bitmap—an image to be displayed</a:t>
             </a:r>
-            <a:endParaRPr/>
-          </a:p>
-          <a:p>
-            <a:pPr marL="457200" lvl="0" indent="-342900" algn="l" rtl="0">
-              <a:spcBef>
-                <a:spcPts val="0"/>
-              </a:spcBef>
-              <a:spcAft>
-                <a:spcPts val="0"/>
-              </a:spcAft>
-              <a:buSzPts val="1800"/>
-              <a:buChar char="●"/>
-            </a:pPr>
-            <a:r>
-              <a:rPr lang="en" sz="1800"/>
-              <a:t>Use Void if no data passed</a:t>
-            </a:r>
-            <a:endParaRPr sz="1800"/>
+            <a:endParaRPr dirty="0"/>
           </a:p>
         </p:txBody>
       </p:sp>
@@ -52806,7 +52908,7 @@
         </p:nvSpPr>
         <p:spPr>
           <a:xfrm>
-            <a:off x="3155375" y="2342380"/>
+            <a:off x="3155375" y="2476391"/>
             <a:ext cx="1156200" cy="165300"/>
           </a:xfrm>
           <a:prstGeom prst="rightArrow">
@@ -52849,7 +52951,7 @@
         </p:nvSpPr>
         <p:spPr>
           <a:xfrm>
-            <a:off x="3059975" y="2899530"/>
+            <a:off x="3059975" y="3033541"/>
             <a:ext cx="1156200" cy="165300"/>
           </a:xfrm>
           <a:prstGeom prst="rightArrow">

</xml_diff>